<commit_message>
Updated figures for main text and the supplementary figures file
</commit_message>
<xml_diff>
--- a/report_graphs/figure1/fig1.pptx
+++ b/report_graphs/figure1/fig1.pptx
@@ -243,7 +243,7 @@
           <a:p>
             <a:fld id="{F1981167-8195-4600-A3E6-37266B8F7378}" type="datetimeFigureOut">
               <a:rPr lang="en-AU" smtClean="0"/>
-              <a:t>29/07/2022</a:t>
+              <a:t>26/08/2022</a:t>
             </a:fld>
             <a:endParaRPr lang="en-AU"/>
           </a:p>
@@ -413,7 +413,7 @@
           <a:p>
             <a:fld id="{F1981167-8195-4600-A3E6-37266B8F7378}" type="datetimeFigureOut">
               <a:rPr lang="en-AU" smtClean="0"/>
-              <a:t>29/07/2022</a:t>
+              <a:t>26/08/2022</a:t>
             </a:fld>
             <a:endParaRPr lang="en-AU"/>
           </a:p>
@@ -593,7 +593,7 @@
           <a:p>
             <a:fld id="{F1981167-8195-4600-A3E6-37266B8F7378}" type="datetimeFigureOut">
               <a:rPr lang="en-AU" smtClean="0"/>
-              <a:t>29/07/2022</a:t>
+              <a:t>26/08/2022</a:t>
             </a:fld>
             <a:endParaRPr lang="en-AU"/>
           </a:p>
@@ -1293,7 +1293,7 @@
           <a:p>
             <a:fld id="{F1981167-8195-4600-A3E6-37266B8F7378}" type="datetimeFigureOut">
               <a:rPr lang="en-AU" smtClean="0"/>
-              <a:t>29/07/2022</a:t>
+              <a:t>26/08/2022</a:t>
             </a:fld>
             <a:endParaRPr lang="en-AU"/>
           </a:p>
@@ -1539,7 +1539,7 @@
           <a:p>
             <a:fld id="{F1981167-8195-4600-A3E6-37266B8F7378}" type="datetimeFigureOut">
               <a:rPr lang="en-AU" smtClean="0"/>
-              <a:t>29/07/2022</a:t>
+              <a:t>26/08/2022</a:t>
             </a:fld>
             <a:endParaRPr lang="en-AU"/>
           </a:p>
@@ -1771,7 +1771,7 @@
           <a:p>
             <a:fld id="{F1981167-8195-4600-A3E6-37266B8F7378}" type="datetimeFigureOut">
               <a:rPr lang="en-AU" smtClean="0"/>
-              <a:t>29/07/2022</a:t>
+              <a:t>26/08/2022</a:t>
             </a:fld>
             <a:endParaRPr lang="en-AU"/>
           </a:p>
@@ -2138,7 +2138,7 @@
           <a:p>
             <a:fld id="{F1981167-8195-4600-A3E6-37266B8F7378}" type="datetimeFigureOut">
               <a:rPr lang="en-AU" smtClean="0"/>
-              <a:t>29/07/2022</a:t>
+              <a:t>26/08/2022</a:t>
             </a:fld>
             <a:endParaRPr lang="en-AU"/>
           </a:p>
@@ -2256,7 +2256,7 @@
           <a:p>
             <a:fld id="{F1981167-8195-4600-A3E6-37266B8F7378}" type="datetimeFigureOut">
               <a:rPr lang="en-AU" smtClean="0"/>
-              <a:t>29/07/2022</a:t>
+              <a:t>26/08/2022</a:t>
             </a:fld>
             <a:endParaRPr lang="en-AU"/>
           </a:p>
@@ -2351,7 +2351,7 @@
           <a:p>
             <a:fld id="{F1981167-8195-4600-A3E6-37266B8F7378}" type="datetimeFigureOut">
               <a:rPr lang="en-AU" smtClean="0"/>
-              <a:t>29/07/2022</a:t>
+              <a:t>26/08/2022</a:t>
             </a:fld>
             <a:endParaRPr lang="en-AU"/>
           </a:p>
@@ -2628,7 +2628,7 @@
           <a:p>
             <a:fld id="{F1981167-8195-4600-A3E6-37266B8F7378}" type="datetimeFigureOut">
               <a:rPr lang="en-AU" smtClean="0"/>
-              <a:t>29/07/2022</a:t>
+              <a:t>26/08/2022</a:t>
             </a:fld>
             <a:endParaRPr lang="en-AU"/>
           </a:p>
@@ -2885,7 +2885,7 @@
           <a:p>
             <a:fld id="{F1981167-8195-4600-A3E6-37266B8F7378}" type="datetimeFigureOut">
               <a:rPr lang="en-AU" smtClean="0"/>
-              <a:t>29/07/2022</a:t>
+              <a:t>26/08/2022</a:t>
             </a:fld>
             <a:endParaRPr lang="en-AU"/>
           </a:p>
@@ -3098,7 +3098,7 @@
           <a:p>
             <a:fld id="{F1981167-8195-4600-A3E6-37266B8F7378}" type="datetimeFigureOut">
               <a:rPr lang="en-AU" smtClean="0"/>
-              <a:t>29/07/2022</a:t>
+              <a:t>26/08/2022</a:t>
             </a:fld>
             <a:endParaRPr lang="en-AU"/>
           </a:p>
@@ -3853,15 +3853,13 @@
           </p:cNvPr>
           <p:cNvCxnSpPr>
             <a:cxnSpLocks/>
-            <a:stCxn id="5" idx="3"/>
-            <a:endCxn id="70" idx="1"/>
           </p:cNvCxnSpPr>
           <p:nvPr/>
         </p:nvCxnSpPr>
         <p:spPr>
-          <a:xfrm flipV="1">
-            <a:off x="1503313" y="2106760"/>
-            <a:ext cx="648304" cy="456044"/>
+          <a:xfrm flipH="1">
+            <a:off x="1547053" y="2106760"/>
+            <a:ext cx="604564" cy="413043"/>
           </a:xfrm>
           <a:prstGeom prst="straightConnector1">
             <a:avLst/>
@@ -4075,7 +4073,7 @@
             <a:pPr algn="ctr"/>
             <a:r>
               <a:rPr lang="en-AU" sz="1200" dirty="0"/>
-              <a:t>Paper 1</a:t>
+              <a:t>Paper A</a:t>
             </a:r>
           </a:p>
         </p:txBody>
@@ -4199,15 +4197,13 @@
           </p:cNvPr>
           <p:cNvCxnSpPr>
             <a:cxnSpLocks/>
-            <a:stCxn id="66" idx="3"/>
-            <a:endCxn id="71" idx="1"/>
           </p:cNvCxnSpPr>
           <p:nvPr/>
         </p:nvCxnSpPr>
         <p:spPr>
-          <a:xfrm>
-            <a:off x="1503313" y="3451191"/>
-            <a:ext cx="648304" cy="596085"/>
+          <a:xfrm flipH="1" flipV="1">
+            <a:off x="1539851" y="3496764"/>
+            <a:ext cx="611766" cy="550513"/>
           </a:xfrm>
           <a:prstGeom prst="straightConnector1">
             <a:avLst/>
@@ -4245,15 +4241,13 @@
           </p:cNvPr>
           <p:cNvCxnSpPr>
             <a:cxnSpLocks/>
-            <a:stCxn id="66" idx="3"/>
-            <a:endCxn id="75" idx="1"/>
           </p:cNvCxnSpPr>
           <p:nvPr/>
         </p:nvCxnSpPr>
         <p:spPr>
-          <a:xfrm flipV="1">
-            <a:off x="1503313" y="3077019"/>
-            <a:ext cx="648304" cy="374173"/>
+          <a:xfrm flipH="1">
+            <a:off x="1534669" y="3077018"/>
+            <a:ext cx="616948" cy="339728"/>
           </a:xfrm>
           <a:prstGeom prst="straightConnector1">
             <a:avLst/>
@@ -4310,11 +4304,11 @@
           <a:p>
             <a:r>
               <a:rPr lang="en-AU" sz="1200" b="1" i="1" dirty="0"/>
-              <a:t>Equal citation counts does not imply same level of diversity in citing actors. </a:t>
+              <a:t>Equal citation counts does not imply same level of diversity in citing actors</a:t>
             </a:r>
             <a:r>
               <a:rPr lang="en-AU" sz="1200" dirty="0"/>
-              <a:t>E.g., Paper 1 and 2 have the same citation count (2), but Paper 1 is cited by more institutions (5) from more countries (3).</a:t>
+              <a:t>, e.g., Paper 1 and 2 have the same citation count (2), but Paper 1 is cited by more institutions (5) from more countries (3).</a:t>
             </a:r>
           </a:p>
         </p:txBody>
@@ -4330,15 +4324,13 @@
           </p:cNvPr>
           <p:cNvCxnSpPr>
             <a:cxnSpLocks/>
-            <a:stCxn id="5" idx="3"/>
-            <a:endCxn id="75" idx="1"/>
           </p:cNvCxnSpPr>
           <p:nvPr/>
         </p:nvCxnSpPr>
         <p:spPr>
-          <a:xfrm>
-            <a:off x="1503313" y="2562805"/>
-            <a:ext cx="648304" cy="514213"/>
+          <a:xfrm flipH="1" flipV="1">
+            <a:off x="1539851" y="2608973"/>
+            <a:ext cx="611766" cy="468046"/>
           </a:xfrm>
           <a:prstGeom prst="straightConnector1">
             <a:avLst/>
@@ -4434,7 +4426,7 @@
             <a:pPr algn="ctr"/>
             <a:r>
               <a:rPr lang="en-AU" sz="1200" dirty="0"/>
-              <a:t>Paper 2</a:t>
+              <a:t>Paper B</a:t>
             </a:r>
           </a:p>
         </p:txBody>
@@ -4754,15 +4746,13 @@
           </p:cNvPr>
           <p:cNvCxnSpPr>
             <a:cxnSpLocks/>
-            <a:stCxn id="70" idx="3"/>
-            <a:endCxn id="85" idx="1"/>
           </p:cNvCxnSpPr>
           <p:nvPr/>
         </p:nvCxnSpPr>
         <p:spPr>
-          <a:xfrm flipV="1">
-            <a:off x="2619616" y="1876294"/>
-            <a:ext cx="648304" cy="230469"/>
+          <a:xfrm flipH="1">
+            <a:off x="2658452" y="1876293"/>
+            <a:ext cx="609468" cy="208343"/>
           </a:xfrm>
           <a:prstGeom prst="straightConnector1">
             <a:avLst/>
@@ -4800,15 +4790,13 @@
           </p:cNvPr>
           <p:cNvCxnSpPr>
             <a:cxnSpLocks/>
-            <a:stCxn id="70" idx="3"/>
-            <a:endCxn id="86" idx="1"/>
           </p:cNvCxnSpPr>
           <p:nvPr/>
         </p:nvCxnSpPr>
         <p:spPr>
-          <a:xfrm>
-            <a:off x="2619616" y="2106762"/>
-            <a:ext cx="648304" cy="367295"/>
+          <a:xfrm flipH="1" flipV="1">
+            <a:off x="2656465" y="2141867"/>
+            <a:ext cx="611455" cy="332191"/>
           </a:xfrm>
           <a:prstGeom prst="straightConnector1">
             <a:avLst/>
@@ -4846,15 +4834,13 @@
           </p:cNvPr>
           <p:cNvCxnSpPr>
             <a:cxnSpLocks/>
-            <a:stCxn id="70" idx="3"/>
-            <a:endCxn id="81" idx="1"/>
           </p:cNvCxnSpPr>
           <p:nvPr/>
         </p:nvCxnSpPr>
         <p:spPr>
-          <a:xfrm>
-            <a:off x="2619616" y="2106760"/>
-            <a:ext cx="648304" cy="964661"/>
+          <a:xfrm flipH="1" flipV="1">
+            <a:off x="2649134" y="2209983"/>
+            <a:ext cx="618786" cy="861439"/>
           </a:xfrm>
           <a:prstGeom prst="straightConnector1">
             <a:avLst/>
@@ -4892,15 +4878,13 @@
           </p:cNvPr>
           <p:cNvCxnSpPr>
             <a:cxnSpLocks/>
-            <a:stCxn id="75" idx="3"/>
-            <a:endCxn id="83" idx="1"/>
           </p:cNvCxnSpPr>
           <p:nvPr/>
         </p:nvCxnSpPr>
         <p:spPr>
-          <a:xfrm>
-            <a:off x="2619616" y="3077017"/>
-            <a:ext cx="648304" cy="591770"/>
+          <a:xfrm flipH="1" flipV="1">
+            <a:off x="2656465" y="3082128"/>
+            <a:ext cx="611455" cy="586659"/>
           </a:xfrm>
           <a:prstGeom prst="straightConnector1">
             <a:avLst/>
@@ -4938,15 +4922,13 @@
           </p:cNvPr>
           <p:cNvCxnSpPr>
             <a:cxnSpLocks/>
-            <a:stCxn id="71" idx="3"/>
-            <a:endCxn id="84" idx="1"/>
           </p:cNvCxnSpPr>
           <p:nvPr/>
         </p:nvCxnSpPr>
         <p:spPr>
-          <a:xfrm>
-            <a:off x="2619616" y="4047274"/>
-            <a:ext cx="648304" cy="219043"/>
+          <a:xfrm flipH="1" flipV="1">
+            <a:off x="2649134" y="4037912"/>
+            <a:ext cx="618786" cy="228406"/>
           </a:xfrm>
           <a:prstGeom prst="straightConnector1">
             <a:avLst/>
@@ -4984,15 +4966,13 @@
           </p:cNvPr>
           <p:cNvCxnSpPr>
             <a:cxnSpLocks/>
-            <a:stCxn id="75" idx="3"/>
-            <a:endCxn id="84" idx="1"/>
           </p:cNvCxnSpPr>
           <p:nvPr/>
         </p:nvCxnSpPr>
         <p:spPr>
-          <a:xfrm>
-            <a:off x="2619616" y="3077019"/>
-            <a:ext cx="648304" cy="1189300"/>
+          <a:xfrm flipH="1" flipV="1">
+            <a:off x="2649134" y="3196769"/>
+            <a:ext cx="618786" cy="1069550"/>
           </a:xfrm>
           <a:prstGeom prst="straightConnector1">
             <a:avLst/>
@@ -5993,15 +5973,13 @@
           </p:cNvPr>
           <p:cNvCxnSpPr>
             <a:cxnSpLocks/>
-            <a:stCxn id="125" idx="2"/>
-            <a:endCxn id="129" idx="0"/>
           </p:cNvCxnSpPr>
           <p:nvPr/>
         </p:nvCxnSpPr>
         <p:spPr>
-          <a:xfrm flipH="1">
-            <a:off x="8846083" y="1105711"/>
-            <a:ext cx="22941" cy="977342"/>
+          <a:xfrm flipV="1">
+            <a:off x="8846082" y="1145526"/>
+            <a:ext cx="17150" cy="937527"/>
           </a:xfrm>
           <a:prstGeom prst="straightConnector1">
             <a:avLst/>
@@ -6039,15 +6017,13 @@
           </p:cNvPr>
           <p:cNvCxnSpPr>
             <a:cxnSpLocks/>
-            <a:stCxn id="125" idx="2"/>
-            <a:endCxn id="138" idx="0"/>
           </p:cNvCxnSpPr>
           <p:nvPr/>
         </p:nvCxnSpPr>
         <p:spPr>
-          <a:xfrm>
-            <a:off x="8869021" y="1105710"/>
-            <a:ext cx="562942" cy="1225528"/>
+          <a:xfrm flipH="1" flipV="1">
+            <a:off x="8922300" y="1139209"/>
+            <a:ext cx="509663" cy="1192029"/>
           </a:xfrm>
           <a:prstGeom prst="straightConnector1">
             <a:avLst/>
@@ -6085,15 +6061,13 @@
           </p:cNvPr>
           <p:cNvCxnSpPr>
             <a:cxnSpLocks/>
-            <a:stCxn id="125" idx="2"/>
-            <a:endCxn id="131" idx="0"/>
           </p:cNvCxnSpPr>
           <p:nvPr/>
         </p:nvCxnSpPr>
         <p:spPr>
-          <a:xfrm>
-            <a:off x="8869021" y="1105711"/>
-            <a:ext cx="1148825" cy="977342"/>
+          <a:xfrm flipH="1" flipV="1">
+            <a:off x="8980505" y="1100484"/>
+            <a:ext cx="1037342" cy="982569"/>
           </a:xfrm>
           <a:prstGeom prst="straightConnector1">
             <a:avLst/>
@@ -6131,15 +6105,13 @@
           </p:cNvPr>
           <p:cNvCxnSpPr>
             <a:cxnSpLocks/>
-            <a:stCxn id="124" idx="2"/>
-            <a:endCxn id="129" idx="1"/>
           </p:cNvCxnSpPr>
           <p:nvPr/>
         </p:nvCxnSpPr>
         <p:spPr>
-          <a:xfrm>
-            <a:off x="7627971" y="1101819"/>
-            <a:ext cx="1074111" cy="1125233"/>
+          <a:xfrm flipH="1" flipV="1">
+            <a:off x="7761477" y="1087571"/>
+            <a:ext cx="940606" cy="1139482"/>
           </a:xfrm>
           <a:prstGeom prst="straightConnector1">
             <a:avLst/>
@@ -6177,15 +6149,13 @@
           </p:cNvPr>
           <p:cNvCxnSpPr>
             <a:cxnSpLocks/>
-            <a:stCxn id="124" idx="2"/>
-            <a:endCxn id="140" idx="0"/>
           </p:cNvCxnSpPr>
           <p:nvPr/>
         </p:nvCxnSpPr>
         <p:spPr>
-          <a:xfrm flipH="1">
-            <a:off x="6502550" y="1101819"/>
-            <a:ext cx="1125421" cy="981234"/>
+          <a:xfrm flipV="1">
+            <a:off x="6502551" y="1100484"/>
+            <a:ext cx="1004826" cy="982571"/>
           </a:xfrm>
           <a:prstGeom prst="straightConnector1">
             <a:avLst/>
@@ -6223,15 +6193,13 @@
           </p:cNvPr>
           <p:cNvCxnSpPr>
             <a:cxnSpLocks/>
-            <a:stCxn id="124" idx="2"/>
-            <a:endCxn id="126" idx="0"/>
           </p:cNvCxnSpPr>
           <p:nvPr/>
         </p:nvCxnSpPr>
         <p:spPr>
-          <a:xfrm flipH="1">
-            <a:off x="7088431" y="1101819"/>
-            <a:ext cx="539538" cy="1229420"/>
+          <a:xfrm flipV="1">
+            <a:off x="7088431" y="1123573"/>
+            <a:ext cx="485760" cy="1207666"/>
           </a:xfrm>
           <a:prstGeom prst="straightConnector1">
             <a:avLst/>
@@ -6269,15 +6237,13 @@
           </p:cNvPr>
           <p:cNvCxnSpPr>
             <a:cxnSpLocks/>
-            <a:stCxn id="124" idx="2"/>
-            <a:endCxn id="128" idx="0"/>
           </p:cNvCxnSpPr>
           <p:nvPr/>
         </p:nvCxnSpPr>
         <p:spPr>
-          <a:xfrm>
-            <a:off x="7627972" y="1101819"/>
-            <a:ext cx="46345" cy="981234"/>
+          <a:xfrm flipH="1" flipV="1">
+            <a:off x="7635478" y="1130698"/>
+            <a:ext cx="38840" cy="952355"/>
           </a:xfrm>
           <a:prstGeom prst="straightConnector1">
             <a:avLst/>
@@ -6315,15 +6281,13 @@
           </p:cNvPr>
           <p:cNvCxnSpPr>
             <a:cxnSpLocks/>
-            <a:stCxn id="124" idx="2"/>
-            <a:endCxn id="130" idx="0"/>
           </p:cNvCxnSpPr>
           <p:nvPr/>
         </p:nvCxnSpPr>
         <p:spPr>
-          <a:xfrm>
-            <a:off x="7627969" y="1101819"/>
-            <a:ext cx="632228" cy="1233234"/>
+          <a:xfrm flipH="1" flipV="1">
+            <a:off x="7696255" y="1119961"/>
+            <a:ext cx="563942" cy="1215092"/>
           </a:xfrm>
           <a:prstGeom prst="straightConnector1">
             <a:avLst/>
@@ -6361,15 +6325,13 @@
           </p:cNvPr>
           <p:cNvCxnSpPr>
             <a:cxnSpLocks/>
-            <a:stCxn id="140" idx="2"/>
-            <a:endCxn id="185" idx="0"/>
           </p:cNvCxnSpPr>
           <p:nvPr/>
         </p:nvCxnSpPr>
         <p:spPr>
-          <a:xfrm flipH="1">
-            <a:off x="5892948" y="2371055"/>
-            <a:ext cx="609600" cy="1090161"/>
+          <a:xfrm flipV="1">
+            <a:off x="5892948" y="2397249"/>
+            <a:ext cx="535254" cy="1063968"/>
           </a:xfrm>
           <a:prstGeom prst="straightConnector1">
             <a:avLst/>
@@ -6407,15 +6369,13 @@
           </p:cNvPr>
           <p:cNvCxnSpPr>
             <a:cxnSpLocks/>
-            <a:stCxn id="126" idx="2"/>
-            <a:endCxn id="191" idx="3"/>
           </p:cNvCxnSpPr>
           <p:nvPr/>
         </p:nvCxnSpPr>
         <p:spPr>
-          <a:xfrm flipH="1">
-            <a:off x="5633684" y="2619241"/>
-            <a:ext cx="1454749" cy="620642"/>
+          <a:xfrm flipV="1">
+            <a:off x="5633683" y="2643130"/>
+            <a:ext cx="1362206" cy="596753"/>
           </a:xfrm>
           <a:prstGeom prst="straightConnector1">
             <a:avLst/>
@@ -6453,15 +6413,13 @@
           </p:cNvPr>
           <p:cNvCxnSpPr>
             <a:cxnSpLocks/>
-            <a:stCxn id="140" idx="2"/>
-            <a:endCxn id="187" idx="3"/>
           </p:cNvCxnSpPr>
           <p:nvPr/>
         </p:nvCxnSpPr>
         <p:spPr>
-          <a:xfrm flipH="1">
-            <a:off x="5460058" y="2371055"/>
-            <a:ext cx="1042491" cy="412937"/>
+          <a:xfrm flipV="1">
+            <a:off x="5460057" y="2362992"/>
+            <a:ext cx="919648" cy="421001"/>
           </a:xfrm>
           <a:prstGeom prst="straightConnector1">
             <a:avLst/>
@@ -6499,15 +6457,13 @@
           </p:cNvPr>
           <p:cNvCxnSpPr>
             <a:cxnSpLocks/>
-            <a:stCxn id="125" idx="2"/>
-            <a:endCxn id="128" idx="0"/>
           </p:cNvCxnSpPr>
           <p:nvPr/>
         </p:nvCxnSpPr>
         <p:spPr>
-          <a:xfrm flipH="1">
-            <a:off x="7674315" y="1105711"/>
-            <a:ext cx="1194707" cy="977342"/>
+          <a:xfrm flipV="1">
+            <a:off x="7674314" y="1105711"/>
+            <a:ext cx="1079077" cy="977342"/>
           </a:xfrm>
           <a:prstGeom prst="straightConnector1">
             <a:avLst/>
@@ -6545,15 +6501,13 @@
           </p:cNvPr>
           <p:cNvCxnSpPr>
             <a:cxnSpLocks/>
-            <a:stCxn id="125" idx="2"/>
-            <a:endCxn id="130" idx="0"/>
           </p:cNvCxnSpPr>
           <p:nvPr/>
         </p:nvCxnSpPr>
         <p:spPr>
-          <a:xfrm flipH="1">
-            <a:off x="8260197" y="1105711"/>
-            <a:ext cx="608824" cy="1229342"/>
+          <a:xfrm flipV="1">
+            <a:off x="8260197" y="1127385"/>
+            <a:ext cx="542009" cy="1207668"/>
           </a:xfrm>
           <a:prstGeom prst="straightConnector1">
             <a:avLst/>
@@ -6591,15 +6545,13 @@
           </p:cNvPr>
           <p:cNvCxnSpPr>
             <a:cxnSpLocks/>
-            <a:stCxn id="129" idx="2"/>
-            <a:endCxn id="183" idx="0"/>
           </p:cNvCxnSpPr>
           <p:nvPr/>
         </p:nvCxnSpPr>
         <p:spPr>
-          <a:xfrm>
-            <a:off x="8846080" y="2371055"/>
-            <a:ext cx="709380" cy="1550724"/>
+          <a:xfrm flipH="1" flipV="1">
+            <a:off x="8909709" y="2390637"/>
+            <a:ext cx="645751" cy="1531142"/>
           </a:xfrm>
           <a:prstGeom prst="straightConnector1">
             <a:avLst/>
@@ -6637,15 +6589,13 @@
           </p:cNvPr>
           <p:cNvCxnSpPr>
             <a:cxnSpLocks/>
-            <a:stCxn id="138" idx="2"/>
-            <a:endCxn id="189" idx="0"/>
           </p:cNvCxnSpPr>
           <p:nvPr/>
         </p:nvCxnSpPr>
         <p:spPr>
-          <a:xfrm>
-            <a:off x="9431965" y="2619241"/>
-            <a:ext cx="697547" cy="1117213"/>
+          <a:xfrm flipH="1" flipV="1">
+            <a:off x="9549115" y="2636443"/>
+            <a:ext cx="580398" cy="1100012"/>
           </a:xfrm>
           <a:prstGeom prst="straightConnector1">
             <a:avLst/>
@@ -6683,15 +6633,13 @@
           </p:cNvPr>
           <p:cNvCxnSpPr>
             <a:cxnSpLocks/>
-            <a:stCxn id="131" idx="2"/>
-            <a:endCxn id="181" idx="1"/>
           </p:cNvCxnSpPr>
           <p:nvPr/>
         </p:nvCxnSpPr>
         <p:spPr>
-          <a:xfrm>
-            <a:off x="10017848" y="2371053"/>
-            <a:ext cx="886575" cy="870399"/>
+          <a:xfrm flipH="1" flipV="1">
+            <a:off x="10150569" y="2367485"/>
+            <a:ext cx="753855" cy="873968"/>
           </a:xfrm>
           <a:prstGeom prst="straightConnector1">
             <a:avLst/>
@@ -6729,15 +6677,13 @@
           </p:cNvPr>
           <p:cNvCxnSpPr>
             <a:cxnSpLocks/>
-            <a:stCxn id="131" idx="2"/>
-            <a:endCxn id="180" idx="1"/>
           </p:cNvCxnSpPr>
           <p:nvPr/>
         </p:nvCxnSpPr>
         <p:spPr>
-          <a:xfrm>
-            <a:off x="10017846" y="2371053"/>
-            <a:ext cx="1061822" cy="409389"/>
+          <a:xfrm flipH="1" flipV="1">
+            <a:off x="10188238" y="2318832"/>
+            <a:ext cx="891430" cy="461611"/>
           </a:xfrm>
           <a:prstGeom prst="straightConnector1">
             <a:avLst/>
@@ -6775,15 +6721,13 @@
           </p:cNvPr>
           <p:cNvCxnSpPr>
             <a:cxnSpLocks/>
-            <a:stCxn id="138" idx="2"/>
-            <a:endCxn id="192" idx="1"/>
           </p:cNvCxnSpPr>
           <p:nvPr/>
         </p:nvCxnSpPr>
         <p:spPr>
-          <a:xfrm>
-            <a:off x="9431963" y="2619239"/>
-            <a:ext cx="1109696" cy="949136"/>
+          <a:xfrm flipH="1" flipV="1">
+            <a:off x="9609089" y="2589090"/>
+            <a:ext cx="932570" cy="979285"/>
           </a:xfrm>
           <a:prstGeom prst="straightConnector1">
             <a:avLst/>
@@ -6821,15 +6765,13 @@
           </p:cNvPr>
           <p:cNvCxnSpPr>
             <a:cxnSpLocks/>
-            <a:stCxn id="129" idx="2"/>
-            <a:endCxn id="182" idx="0"/>
           </p:cNvCxnSpPr>
           <p:nvPr/>
         </p:nvCxnSpPr>
         <p:spPr>
-          <a:xfrm>
-            <a:off x="8846082" y="2371055"/>
-            <a:ext cx="85898" cy="1648400"/>
+          <a:xfrm flipH="1" flipV="1">
+            <a:off x="8850198" y="2403203"/>
+            <a:ext cx="81782" cy="1616252"/>
           </a:xfrm>
           <a:prstGeom prst="straightConnector1">
             <a:avLst/>
@@ -6867,15 +6809,13 @@
           </p:cNvPr>
           <p:cNvCxnSpPr>
             <a:cxnSpLocks/>
-            <a:stCxn id="130" idx="2"/>
-            <a:endCxn id="186" idx="0"/>
           </p:cNvCxnSpPr>
           <p:nvPr/>
         </p:nvCxnSpPr>
         <p:spPr>
-          <a:xfrm>
-            <a:off x="8260198" y="2623052"/>
-            <a:ext cx="1720" cy="1443775"/>
+          <a:xfrm flipV="1">
+            <a:off x="8261918" y="2653035"/>
+            <a:ext cx="9392" cy="1413793"/>
           </a:xfrm>
           <a:prstGeom prst="straightConnector1">
             <a:avLst/>
@@ -6913,15 +6853,13 @@
           </p:cNvPr>
           <p:cNvCxnSpPr>
             <a:cxnSpLocks/>
-            <a:stCxn id="140" idx="2"/>
-            <a:endCxn id="184" idx="0"/>
           </p:cNvCxnSpPr>
           <p:nvPr/>
         </p:nvCxnSpPr>
         <p:spPr>
-          <a:xfrm flipH="1">
-            <a:off x="6398854" y="2371053"/>
-            <a:ext cx="103694" cy="1358049"/>
+          <a:xfrm flipV="1">
+            <a:off x="6398854" y="2405312"/>
+            <a:ext cx="101407" cy="1323791"/>
           </a:xfrm>
           <a:prstGeom prst="straightConnector1">
             <a:avLst/>
@@ -6959,15 +6897,13 @@
           </p:cNvPr>
           <p:cNvCxnSpPr>
             <a:cxnSpLocks/>
-            <a:stCxn id="130" idx="2"/>
-            <a:endCxn id="182" idx="0"/>
           </p:cNvCxnSpPr>
           <p:nvPr/>
         </p:nvCxnSpPr>
         <p:spPr>
-          <a:xfrm>
-            <a:off x="8260199" y="2623053"/>
-            <a:ext cx="671782" cy="1396400"/>
+          <a:xfrm flipH="1" flipV="1">
+            <a:off x="8334857" y="2655204"/>
+            <a:ext cx="597124" cy="1364249"/>
           </a:xfrm>
           <a:prstGeom prst="straightConnector1">
             <a:avLst/>
@@ -7005,13 +6941,11 @@
           </p:cNvPr>
           <p:cNvCxnSpPr>
             <a:cxnSpLocks/>
-            <a:stCxn id="128" idx="2"/>
-            <a:endCxn id="186" idx="0"/>
           </p:cNvCxnSpPr>
           <p:nvPr/>
         </p:nvCxnSpPr>
         <p:spPr>
-          <a:xfrm>
+          <a:xfrm rot="10800000">
             <a:off x="7674314" y="2371055"/>
             <a:ext cx="587604" cy="1695774"/>
           </a:xfrm>
@@ -7051,15 +6985,13 @@
           </p:cNvPr>
           <p:cNvCxnSpPr>
             <a:cxnSpLocks/>
-            <a:stCxn id="126" idx="2"/>
-            <a:endCxn id="188" idx="0"/>
           </p:cNvCxnSpPr>
           <p:nvPr/>
         </p:nvCxnSpPr>
         <p:spPr>
-          <a:xfrm flipH="1">
-            <a:off x="6976308" y="2619241"/>
-            <a:ext cx="112125" cy="1287837"/>
+          <a:xfrm flipV="1">
+            <a:off x="6976307" y="2653035"/>
+            <a:ext cx="59336" cy="1254044"/>
           </a:xfrm>
           <a:prstGeom prst="straightConnector1">
             <a:avLst/>
@@ -7100,8 +7032,8 @@
         </p:nvSpPr>
         <p:spPr>
           <a:xfrm>
-            <a:off x="8714750" y="607481"/>
-            <a:ext cx="267603" cy="338554"/>
+            <a:off x="8217473" y="567611"/>
+            <a:ext cx="1303096" cy="307777"/>
           </a:xfrm>
           <a:prstGeom prst="rect">
             <a:avLst/>
@@ -7116,8 +7048,8 @@
           <a:p>
             <a:pPr algn="ctr"/>
             <a:r>
-              <a:rPr lang="en-AU" sz="1600" dirty="0"/>
-              <a:t>B</a:t>
+              <a:rPr lang="en-AU" sz="1400" dirty="0"/>
+              <a:t>Paper D</a:t>
             </a:r>
           </a:p>
         </p:txBody>
@@ -7136,8 +7068,8 @@
         </p:nvSpPr>
         <p:spPr>
           <a:xfrm>
-            <a:off x="7508297" y="607481"/>
-            <a:ext cx="245672" cy="338554"/>
+            <a:off x="7216926" y="567611"/>
+            <a:ext cx="822085" cy="307777"/>
           </a:xfrm>
           <a:prstGeom prst="rect">
             <a:avLst/>
@@ -7152,8 +7084,8 @@
           <a:p>
             <a:pPr algn="ctr"/>
             <a:r>
-              <a:rPr lang="en-AU" sz="1600" dirty="0"/>
-              <a:t>A</a:t>
+              <a:rPr lang="en-AU" sz="1400" dirty="0"/>
+              <a:t>Paper C</a:t>
             </a:r>
           </a:p>
         </p:txBody>
@@ -7173,7 +7105,7 @@
           <p:nvPr>
             <p:extLst>
               <p:ext uri="{D42A27DB-BD31-4B8C-83A1-F6EECF244321}">
-                <p14:modId xmlns:p14="http://schemas.microsoft.com/office/powerpoint/2010/main" val="290618704"/>
+                <p14:modId xmlns:p14="http://schemas.microsoft.com/office/powerpoint/2010/main" val="2026365097"/>
               </p:ext>
             </p:extLst>
           </p:nvPr>
@@ -7249,7 +7181,7 @@
                       </a:r>
                     </a:p>
                   </a:txBody>
-                  <a:tcPr>
+                  <a:tcPr anchor="ctr">
                     <a:solidFill>
                       <a:schemeClr val="bg1">
                         <a:lumMod val="65000"/>
@@ -7273,7 +7205,7 @@
                       </a:r>
                     </a:p>
                   </a:txBody>
-                  <a:tcPr>
+                  <a:tcPr anchor="ctr">
                     <a:solidFill>
                       <a:schemeClr val="bg1">
                         <a:lumMod val="65000"/>
@@ -7293,11 +7225,11 @@
                             <a:schemeClr val="tx1"/>
                           </a:solidFill>
                         </a:rPr>
-                        <a:t># Citing Institutions</a:t>
+                        <a:t># Citing institutions</a:t>
                       </a:r>
                     </a:p>
                   </a:txBody>
-                  <a:tcPr>
+                  <a:tcPr anchor="ctr">
                     <a:solidFill>
                       <a:schemeClr val="bg1">
                         <a:lumMod val="65000"/>
@@ -7317,11 +7249,11 @@
                             <a:schemeClr val="tx1"/>
                           </a:solidFill>
                         </a:rPr>
-                        <a:t># Citing Countries</a:t>
+                        <a:t># Citing countries</a:t>
                       </a:r>
                     </a:p>
                   </a:txBody>
-                  <a:tcPr>
+                  <a:tcPr anchor="ctr">
                     <a:solidFill>
                       <a:schemeClr val="bg1">
                         <a:lumMod val="65000"/>
@@ -7345,7 +7277,7 @@
                       </a:r>
                     </a:p>
                   </a:txBody>
-                  <a:tcPr>
+                  <a:tcPr anchor="ctr">
                     <a:solidFill>
                       <a:schemeClr val="bg1">
                         <a:lumMod val="65000"/>
@@ -7369,7 +7301,7 @@
                       </a:r>
                     </a:p>
                   </a:txBody>
-                  <a:tcPr>
+                  <a:tcPr anchor="ctr">
                     <a:solidFill>
                       <a:schemeClr val="bg1">
                         <a:lumMod val="65000"/>
@@ -7396,11 +7328,11 @@
                             <a:schemeClr val="tx1"/>
                           </a:solidFill>
                         </a:rPr>
-                        <a:t>A</a:t>
+                        <a:t>C</a:t>
                       </a:r>
                     </a:p>
                   </a:txBody>
-                  <a:tcPr>
+                  <a:tcPr anchor="ctr">
                     <a:solidFill>
                       <a:schemeClr val="bg2">
                         <a:lumMod val="90000"/>
@@ -7424,7 +7356,7 @@
                       </a:r>
                     </a:p>
                   </a:txBody>
-                  <a:tcPr>
+                  <a:tcPr anchor="ctr">
                     <a:solidFill>
                       <a:schemeClr val="bg2">
                         <a:lumMod val="90000"/>
@@ -7448,7 +7380,7 @@
                       </a:r>
                     </a:p>
                   </a:txBody>
-                  <a:tcPr>
+                  <a:tcPr anchor="ctr">
                     <a:solidFill>
                       <a:schemeClr val="bg2">
                         <a:lumMod val="90000"/>
@@ -7472,7 +7404,7 @@
                       </a:r>
                     </a:p>
                   </a:txBody>
-                  <a:tcPr>
+                  <a:tcPr anchor="ctr">
                     <a:solidFill>
                       <a:schemeClr val="bg2">
                         <a:lumMod val="90000"/>
@@ -7496,7 +7428,7 @@
                       </a:r>
                     </a:p>
                   </a:txBody>
-                  <a:tcPr>
+                  <a:tcPr anchor="ctr">
                     <a:solidFill>
                       <a:schemeClr val="bg2">
                         <a:lumMod val="90000"/>
@@ -7520,7 +7452,7 @@
                       </a:r>
                     </a:p>
                   </a:txBody>
-                  <a:tcPr>
+                  <a:tcPr anchor="ctr">
                     <a:solidFill>
                       <a:schemeClr val="bg2">
                         <a:lumMod val="90000"/>
@@ -7547,11 +7479,11 @@
                             <a:schemeClr val="tx1"/>
                           </a:solidFill>
                         </a:rPr>
-                        <a:t>B</a:t>
+                        <a:t>D</a:t>
                       </a:r>
                     </a:p>
                   </a:txBody>
-                  <a:tcPr>
+                  <a:tcPr anchor="ctr">
                     <a:solidFill>
                       <a:schemeClr val="bg2">
                         <a:lumMod val="90000"/>
@@ -7575,7 +7507,7 @@
                       </a:r>
                     </a:p>
                   </a:txBody>
-                  <a:tcPr>
+                  <a:tcPr anchor="ctr">
                     <a:solidFill>
                       <a:schemeClr val="bg2">
                         <a:lumMod val="90000"/>
@@ -7599,7 +7531,7 @@
                       </a:r>
                     </a:p>
                   </a:txBody>
-                  <a:tcPr>
+                  <a:tcPr anchor="ctr">
                     <a:solidFill>
                       <a:schemeClr val="bg2">
                         <a:lumMod val="90000"/>
@@ -7623,7 +7555,7 @@
                       </a:r>
                     </a:p>
                   </a:txBody>
-                  <a:tcPr>
+                  <a:tcPr anchor="ctr">
                     <a:solidFill>
                       <a:schemeClr val="bg2">
                         <a:lumMod val="90000"/>
@@ -7647,7 +7579,7 @@
                       </a:r>
                     </a:p>
                   </a:txBody>
-                  <a:tcPr>
+                  <a:tcPr anchor="ctr">
                     <a:solidFill>
                       <a:schemeClr val="bg2">
                         <a:lumMod val="90000"/>
@@ -7671,7 +7603,7 @@
                       </a:r>
                     </a:p>
                   </a:txBody>
-                  <a:tcPr>
+                  <a:tcPr anchor="ctr">
                     <a:solidFill>
                       <a:schemeClr val="bg2">
                         <a:lumMod val="90000"/>
@@ -7700,15 +7632,13 @@
           </p:cNvPr>
           <p:cNvCxnSpPr>
             <a:cxnSpLocks/>
-            <a:stCxn id="126" idx="2"/>
-            <a:endCxn id="190" idx="0"/>
           </p:cNvCxnSpPr>
           <p:nvPr/>
         </p:nvCxnSpPr>
         <p:spPr>
-          <a:xfrm>
-            <a:off x="7088433" y="2619241"/>
-            <a:ext cx="532002" cy="1399963"/>
+          <a:xfrm flipH="1" flipV="1">
+            <a:off x="7103296" y="2653035"/>
+            <a:ext cx="517139" cy="1366170"/>
           </a:xfrm>
           <a:prstGeom prst="straightConnector1">
             <a:avLst/>

</xml_diff>